<commit_message>
add supported by, intro, gpu resources, edit awards
</commit_message>
<xml_diff>
--- a/opening_plenum_session_slides.pptx
+++ b/opening_plenum_session_slides.pptx
@@ -5,7 +5,7 @@
     <p:sldMasterId id="2147483648" r:id="rId1"/>
   </p:sldMasterIdLst>
   <p:notesMasterIdLst>
-    <p:notesMasterId r:id="rId15"/>
+    <p:notesMasterId r:id="rId16"/>
   </p:notesMasterIdLst>
   <p:sldIdLst>
     <p:sldId id="257" r:id="rId2"/>
@@ -18,9 +18,10 @@
     <p:sldId id="271" r:id="rId9"/>
     <p:sldId id="273" r:id="rId10"/>
     <p:sldId id="274" r:id="rId11"/>
-    <p:sldId id="277" r:id="rId12"/>
-    <p:sldId id="266" r:id="rId13"/>
-    <p:sldId id="275" r:id="rId14"/>
+    <p:sldId id="278" r:id="rId12"/>
+    <p:sldId id="277" r:id="rId13"/>
+    <p:sldId id="266" r:id="rId14"/>
+    <p:sldId id="275" r:id="rId15"/>
   </p:sldIdLst>
   <p:sldSz cx="12192000" cy="6858000"/>
   <p:notesSz cx="7010400" cy="9296400"/>
@@ -320,7 +321,7 @@
           <a:p>
             <a:fld id="{ABA92567-EC24-8E4E-8F76-2CAC95D06C65}" type="datetimeFigureOut">
               <a:rPr lang="en-NL" smtClean="0"/>
-              <a:t>05/22/2022</a:t>
+              <a:t>5/27/22</a:t>
             </a:fld>
             <a:endParaRPr lang="en-NL"/>
           </a:p>
@@ -969,7 +970,7 @@
           <a:p>
             <a:fld id="{A41EA36B-F569-7043-A718-487F57441DC6}" type="datetimeFigureOut">
               <a:rPr lang="en-NL" smtClean="0"/>
-              <a:t>05/22/2022</a:t>
+              <a:t>5/27/22</a:t>
             </a:fld>
             <a:endParaRPr lang="en-NL"/>
           </a:p>
@@ -1865,7 +1866,7 @@
           <a:p>
             <a:fld id="{A41EA36B-F569-7043-A718-487F57441DC6}" type="datetimeFigureOut">
               <a:rPr lang="en-NL" smtClean="0"/>
-              <a:t>05/22/2022</a:t>
+              <a:t>5/27/22</a:t>
             </a:fld>
             <a:endParaRPr lang="en-NL"/>
           </a:p>
@@ -2435,7 +2436,7 @@
           <p:cNvPr id="2" name="Title 1">
             <a:extLst>
               <a:ext uri="{FF2B5EF4-FFF2-40B4-BE49-F238E27FC236}">
-                <a16:creationId xmlns:a16="http://schemas.microsoft.com/office/drawing/2014/main" id="{18EC4050-FAC1-40E1-98DB-B3085F0F744A}"/>
+                <a16:creationId xmlns:a16="http://schemas.microsoft.com/office/drawing/2014/main" id="{CA8D9BFD-2E69-C239-C0D7-2787C60A4A71}"/>
               </a:ext>
             </a:extLst>
           </p:cNvPr>
@@ -2446,7 +2447,12 @@
             <p:ph type="title"/>
           </p:nvPr>
         </p:nvSpPr>
-        <p:spPr/>
+        <p:spPr>
+          <a:xfrm>
+            <a:off x="1973112" y="430347"/>
+            <a:ext cx="9662984" cy="544512"/>
+          </a:xfrm>
+        </p:spPr>
         <p:txBody>
           <a:bodyPr>
             <a:normAutofit fontScale="90000"/>
@@ -2454,114 +2460,279 @@
           <a:lstStyle/>
           <a:p>
             <a:r>
-              <a:rPr lang="en-US" dirty="0"/>
-              <a:t>Some Hackathon Tips</a:t>
-            </a:r>
-          </a:p>
-        </p:txBody>
-      </p:sp>
-      <p:sp>
-        <p:nvSpPr>
-          <p:cNvPr id="3" name="Content Placeholder 2">
-            <a:extLst>
-              <a:ext uri="{FF2B5EF4-FFF2-40B4-BE49-F238E27FC236}">
-                <a16:creationId xmlns:a16="http://schemas.microsoft.com/office/drawing/2014/main" id="{8649BF3E-46BF-4795-800A-F811070B2F52}"/>
-              </a:ext>
-            </a:extLst>
-          </p:cNvPr>
-          <p:cNvSpPr>
-            <a:spLocks noGrp="1"/>
-          </p:cNvSpPr>
+              <a:rPr lang="en-AE" dirty="0"/>
+              <a:t>GPU resources</a:t>
+            </a:r>
+          </a:p>
+        </p:txBody>
+      </p:sp>
+      <p:pic>
+        <p:nvPicPr>
+          <p:cNvPr id="4" name="Content Placeholder 3">
+            <a:extLst>
+              <a:ext uri="{FF2B5EF4-FFF2-40B4-BE49-F238E27FC236}">
+                <a16:creationId xmlns:a16="http://schemas.microsoft.com/office/drawing/2014/main" id="{F5C01B08-D496-0F37-9A2F-8109669B91B9}"/>
+              </a:ext>
+            </a:extLst>
+          </p:cNvPr>
+          <p:cNvPicPr>
+            <a:picLocks noGrp="1" noChangeAspect="1"/>
+          </p:cNvPicPr>
           <p:nvPr>
             <p:ph idx="1"/>
           </p:nvPr>
-        </p:nvSpPr>
+        </p:nvPicPr>
+        <p:blipFill>
+          <a:blip r:embed="rId2"/>
+          <a:stretch>
+            <a:fillRect/>
+          </a:stretch>
+        </p:blipFill>
         <p:spPr>
           <a:xfrm>
-            <a:off x="1989438" y="1014970"/>
-            <a:ext cx="9662984" cy="5773179"/>
-          </a:xfrm>
-        </p:spPr>
-        <p:txBody>
-          <a:bodyPr/>
+            <a:off x="6804337" y="1191554"/>
+            <a:ext cx="5387396" cy="4747513"/>
+          </a:xfrm>
+          <a:prstGeom prst="rect">
+            <a:avLst/>
+          </a:prstGeom>
+        </p:spPr>
+      </p:pic>
+      <p:pic>
+        <p:nvPicPr>
+          <p:cNvPr id="5" name="Picture 4">
+            <a:extLst>
+              <a:ext uri="{FF2B5EF4-FFF2-40B4-BE49-F238E27FC236}">
+                <a16:creationId xmlns:a16="http://schemas.microsoft.com/office/drawing/2014/main" id="{DB8538F4-1599-3FDF-F49B-034C3E2001E6}"/>
+              </a:ext>
+            </a:extLst>
+          </p:cNvPr>
+          <p:cNvPicPr>
+            <a:picLocks noChangeAspect="1"/>
+          </p:cNvPicPr>
+          <p:nvPr/>
+        </p:nvPicPr>
+        <p:blipFill>
+          <a:blip r:embed="rId3"/>
+          <a:stretch>
+            <a:fillRect/>
+          </a:stretch>
+        </p:blipFill>
+        <p:spPr>
+          <a:xfrm>
+            <a:off x="1973112" y="1191554"/>
+            <a:ext cx="4437862" cy="1291772"/>
+          </a:xfrm>
+          <a:prstGeom prst="rect">
+            <a:avLst/>
+          </a:prstGeom>
+        </p:spPr>
+      </p:pic>
+      <p:pic>
+        <p:nvPicPr>
+          <p:cNvPr id="6" name="Picture 2" descr="Logos &amp; Brand Guidelines | NVIDIA">
+            <a:extLst>
+              <a:ext uri="{FF2B5EF4-FFF2-40B4-BE49-F238E27FC236}">
+                <a16:creationId xmlns:a16="http://schemas.microsoft.com/office/drawing/2014/main" id="{C658BA6D-9A91-1004-591E-4B3A2869746F}"/>
+              </a:ext>
+            </a:extLst>
+          </p:cNvPr>
+          <p:cNvPicPr>
+            <a:picLocks noChangeAspect="1" noChangeArrowheads="1"/>
+          </p:cNvPicPr>
+          <p:nvPr/>
+        </p:nvPicPr>
+        <p:blipFill>
+          <a:blip r:embed="rId4">
+            <a:extLst>
+              <a:ext uri="{28A0092B-C50C-407E-A947-70E740481C1C}">
+                <a14:useLocalDpi xmlns:a14="http://schemas.microsoft.com/office/drawing/2010/main" val="0"/>
+              </a:ext>
+            </a:extLst>
+          </a:blip>
+          <a:srcRect/>
+          <a:stretch>
+            <a:fillRect/>
+          </a:stretch>
+        </p:blipFill>
+        <p:spPr bwMode="auto">
+          <a:xfrm>
+            <a:off x="9912990" y="53146"/>
+            <a:ext cx="2279010" cy="1281943"/>
+          </a:xfrm>
+          <a:prstGeom prst="rect">
+            <a:avLst/>
+          </a:prstGeom>
+          <a:noFill/>
+          <a:extLst>
+            <a:ext uri="{909E8E84-426E-40DD-AFC4-6F175D3DCCD1}">
+              <a14:hiddenFill xmlns:a14="http://schemas.microsoft.com/office/drawing/2010/main">
+                <a:solidFill>
+                  <a:srgbClr val="FFFFFF"/>
+                </a:solidFill>
+              </a14:hiddenFill>
+            </a:ext>
+          </a:extLst>
+        </p:spPr>
+      </p:pic>
+      <p:sp>
+        <p:nvSpPr>
+          <p:cNvPr id="7" name="TextBox 6">
+            <a:extLst>
+              <a:ext uri="{FF2B5EF4-FFF2-40B4-BE49-F238E27FC236}">
+                <a16:creationId xmlns:a16="http://schemas.microsoft.com/office/drawing/2014/main" id="{5CCF9823-8854-5A16-C307-FA7218005FCE}"/>
+              </a:ext>
+            </a:extLst>
+          </p:cNvPr>
+          <p:cNvSpPr txBox="1"/>
+          <p:nvPr/>
+        </p:nvSpPr>
+        <p:spPr>
+          <a:xfrm>
+            <a:off x="1973112" y="3026883"/>
+            <a:ext cx="4437862" cy="2585323"/>
+          </a:xfrm>
+          <a:prstGeom prst="rect">
+            <a:avLst/>
+          </a:prstGeom>
+          <a:noFill/>
+        </p:spPr>
+        <p:txBody>
+          <a:bodyPr wrap="square" rtlCol="0">
+            <a:spAutoFit/>
+          </a:bodyPr>
           <a:lstStyle/>
           <a:p>
-            <a:pPr marL="0" indent="0">
-              <a:buNone/>
-            </a:pPr>
+            <a:r>
+              <a:rPr lang="en-AE" b="1" dirty="0"/>
+              <a:t>Connect to login node:</a:t>
+            </a:r>
+          </a:p>
+          <a:p>
+            <a:r>
+              <a:rPr lang="en-AE" dirty="0"/>
+              <a:t>ssh you_login@nvpoc.ddnsfree.com</a:t>
+            </a:r>
+          </a:p>
+          <a:p>
+            <a:endParaRPr lang="en-AE" dirty="0"/>
+          </a:p>
+          <a:p>
+            <a:r>
+              <a:rPr lang="en-AE" b="1" dirty="0"/>
+              <a:t>Run interactive session:</a:t>
+            </a:r>
+          </a:p>
+          <a:p>
+            <a:r>
+              <a:rPr lang="en-US" dirty="0" err="1"/>
+              <a:t>srun</a:t>
+            </a:r>
             <a:r>
               <a:rPr lang="en-US" dirty="0"/>
-              <a:t>Take screenshots as you go along – this will save a lot of time when you come to preparing the final presentation</a:t>
-            </a:r>
-          </a:p>
-          <a:p>
-            <a:pPr marL="0" indent="0">
-              <a:buNone/>
-            </a:pPr>
+              <a:t> --</a:t>
+            </a:r>
+            <a:r>
+              <a:rPr lang="en-US" dirty="0" err="1"/>
+              <a:t>gpus</a:t>
+            </a:r>
+            <a:r>
+              <a:rPr lang="en-US" dirty="0"/>
+              <a:t> N  --</a:t>
+            </a:r>
+            <a:r>
+              <a:rPr lang="en-US" dirty="0" err="1"/>
+              <a:t>pty</a:t>
+            </a:r>
+            <a:r>
+              <a:rPr lang="en-US" dirty="0"/>
+              <a:t> bash -</a:t>
+            </a:r>
+            <a:r>
+              <a:rPr lang="en-US" dirty="0" err="1"/>
+              <a:t>i</a:t>
+            </a:r>
+            <a:r>
+              <a:rPr lang="en-US" dirty="0"/>
+              <a:t> </a:t>
+            </a:r>
+            <a:endParaRPr lang="en-AE" dirty="0"/>
+          </a:p>
+          <a:p>
+            <a:endParaRPr lang="en-US" b="1" dirty="0"/>
+          </a:p>
+          <a:p>
+            <a:r>
+              <a:rPr lang="en-US" b="1" dirty="0"/>
+              <a:t>NVIDIA Docker Container Repository</a:t>
+            </a:r>
             <a:endParaRPr lang="en-US" dirty="0"/>
           </a:p>
           <a:p>
-            <a:pPr marL="0" indent="0">
-              <a:buNone/>
-            </a:pPr>
             <a:r>
               <a:rPr lang="en-US" dirty="0"/>
-              <a:t>A little planning goes a long way – post its to organize your work or making a list can help keep focus.  For those online try using a </a:t>
+              <a:t>https://</a:t>
             </a:r>
             <a:r>
               <a:rPr lang="en-US" dirty="0" err="1"/>
-              <a:t>Jamboard</a:t>
+              <a:t>catalog.ngc.nvidia.com</a:t>
             </a:r>
             <a:r>
               <a:rPr lang="en-US" dirty="0"/>
-              <a:t> (</a:t>
-            </a:r>
-            <a:r>
-              <a:rPr lang="en-US" dirty="0">
-                <a:hlinkClick r:id="rId2"/>
-              </a:rPr>
-              <a:t>https://jamboard.google.com/</a:t>
-            </a:r>
-            <a:r>
-              <a:rPr lang="en-US" dirty="0"/>
-              <a:t>) or </a:t>
-            </a:r>
-            <a:r>
-              <a:rPr lang="en-US" dirty="0" err="1"/>
-              <a:t>Github</a:t>
-            </a:r>
-            <a:r>
-              <a:rPr lang="en-US" dirty="0"/>
-              <a:t> Issues</a:t>
-            </a:r>
-          </a:p>
-          <a:p>
-            <a:pPr marL="0" indent="0">
-              <a:buNone/>
-            </a:pPr>
-            <a:endParaRPr lang="en-US" dirty="0"/>
-          </a:p>
-          <a:p>
-            <a:pPr marL="0" indent="0">
-              <a:buNone/>
-            </a:pPr>
-            <a:r>
-              <a:rPr lang="en-US" dirty="0"/>
-              <a:t>By the end of the day today you should have settled on a specific case, sketched out a plan, and have started some work.</a:t>
-            </a:r>
-          </a:p>
-          <a:p>
-            <a:pPr marL="0" indent="0">
-              <a:buNone/>
-            </a:pPr>
-            <a:endParaRPr lang="en-US" dirty="0"/>
+              <a:t>/</a:t>
+            </a:r>
+            <a:endParaRPr lang="en-AE" dirty="0"/>
+          </a:p>
+          <a:p>
+            <a:endParaRPr lang="en-AE" dirty="0"/>
+          </a:p>
+        </p:txBody>
+      </p:sp>
+      <p:sp>
+        <p:nvSpPr>
+          <p:cNvPr id="9" name="Rectangle 8">
+            <a:extLst>
+              <a:ext uri="{FF2B5EF4-FFF2-40B4-BE49-F238E27FC236}">
+                <a16:creationId xmlns:a16="http://schemas.microsoft.com/office/drawing/2014/main" id="{754FA5A8-02C7-6934-864F-A11062E3ACF5}"/>
+              </a:ext>
+            </a:extLst>
+          </p:cNvPr>
+          <p:cNvSpPr/>
+          <p:nvPr/>
+        </p:nvSpPr>
+        <p:spPr>
+          <a:xfrm>
+            <a:off x="1973112" y="6029639"/>
+            <a:ext cx="11332028" cy="584775"/>
+          </a:xfrm>
+          <a:prstGeom prst="rect">
+            <a:avLst/>
+          </a:prstGeom>
+        </p:spPr>
+        <p:txBody>
+          <a:bodyPr wrap="square">
+            <a:spAutoFit/>
+          </a:bodyPr>
+          <a:lstStyle/>
+          <a:p>
+            <a:r>
+              <a:rPr lang="en-US" sz="1600" b="1" dirty="0"/>
+              <a:t>Full details:</a:t>
+            </a:r>
+            <a:endParaRPr lang="en-AE" sz="1600" b="1" dirty="0"/>
+          </a:p>
+          <a:p>
+            <a:r>
+              <a:rPr lang="en-AE" sz="1600" dirty="0"/>
+              <a:t>https://docs.google.com/document/d/1ce94uqAhiggMm9IQvgMElNZiI-T3XDTklsjPcpcv0qA/edit?usp=sharing</a:t>
+            </a:r>
           </a:p>
         </p:txBody>
       </p:sp>
     </p:spTree>
     <p:extLst>
       <p:ext uri="{BB962C8B-B14F-4D97-AF65-F5344CB8AC3E}">
-        <p14:creationId xmlns:p14="http://schemas.microsoft.com/office/powerpoint/2010/main" val="4067170402"/>
+        <p14:creationId xmlns:p14="http://schemas.microsoft.com/office/powerpoint/2010/main" val="4079982055"/>
       </p:ext>
     </p:extLst>
   </p:cSld>
@@ -2590,6 +2761,164 @@
       </p:grpSpPr>
       <p:sp>
         <p:nvSpPr>
+          <p:cNvPr id="2" name="Title 1">
+            <a:extLst>
+              <a:ext uri="{FF2B5EF4-FFF2-40B4-BE49-F238E27FC236}">
+                <a16:creationId xmlns:a16="http://schemas.microsoft.com/office/drawing/2014/main" id="{18EC4050-FAC1-40E1-98DB-B3085F0F744A}"/>
+              </a:ext>
+            </a:extLst>
+          </p:cNvPr>
+          <p:cNvSpPr>
+            <a:spLocks noGrp="1"/>
+          </p:cNvSpPr>
+          <p:nvPr>
+            <p:ph type="title"/>
+          </p:nvPr>
+        </p:nvSpPr>
+        <p:spPr/>
+        <p:txBody>
+          <a:bodyPr>
+            <a:normAutofit fontScale="90000"/>
+          </a:bodyPr>
+          <a:lstStyle/>
+          <a:p>
+            <a:r>
+              <a:rPr lang="en-US" dirty="0"/>
+              <a:t>Some Hackathon Tips</a:t>
+            </a:r>
+          </a:p>
+        </p:txBody>
+      </p:sp>
+      <p:sp>
+        <p:nvSpPr>
+          <p:cNvPr id="3" name="Content Placeholder 2">
+            <a:extLst>
+              <a:ext uri="{FF2B5EF4-FFF2-40B4-BE49-F238E27FC236}">
+                <a16:creationId xmlns:a16="http://schemas.microsoft.com/office/drawing/2014/main" id="{8649BF3E-46BF-4795-800A-F811070B2F52}"/>
+              </a:ext>
+            </a:extLst>
+          </p:cNvPr>
+          <p:cNvSpPr>
+            <a:spLocks noGrp="1"/>
+          </p:cNvSpPr>
+          <p:nvPr>
+            <p:ph idx="1"/>
+          </p:nvPr>
+        </p:nvSpPr>
+        <p:spPr>
+          <a:xfrm>
+            <a:off x="1989438" y="1014970"/>
+            <a:ext cx="9662984" cy="5773179"/>
+          </a:xfrm>
+        </p:spPr>
+        <p:txBody>
+          <a:bodyPr/>
+          <a:lstStyle/>
+          <a:p>
+            <a:pPr marL="0" indent="0">
+              <a:buNone/>
+            </a:pPr>
+            <a:r>
+              <a:rPr lang="en-US" dirty="0"/>
+              <a:t>Take screenshots as you go along – this will save a lot of time when you come to preparing the final presentation</a:t>
+            </a:r>
+          </a:p>
+          <a:p>
+            <a:pPr marL="0" indent="0">
+              <a:buNone/>
+            </a:pPr>
+            <a:endParaRPr lang="en-US" dirty="0"/>
+          </a:p>
+          <a:p>
+            <a:pPr marL="0" indent="0">
+              <a:buNone/>
+            </a:pPr>
+            <a:r>
+              <a:rPr lang="en-US" dirty="0"/>
+              <a:t>A little planning goes a long way – post its to organize your work or making a list can help keep focus.  For those online try using a </a:t>
+            </a:r>
+            <a:r>
+              <a:rPr lang="en-US" dirty="0" err="1"/>
+              <a:t>Jamboard</a:t>
+            </a:r>
+            <a:r>
+              <a:rPr lang="en-US" dirty="0"/>
+              <a:t> (</a:t>
+            </a:r>
+            <a:r>
+              <a:rPr lang="en-US" dirty="0">
+                <a:hlinkClick r:id="rId2"/>
+              </a:rPr>
+              <a:t>https://jamboard.google.com/</a:t>
+            </a:r>
+            <a:r>
+              <a:rPr lang="en-US" dirty="0"/>
+              <a:t>) or </a:t>
+            </a:r>
+            <a:r>
+              <a:rPr lang="en-US" dirty="0" err="1"/>
+              <a:t>Github</a:t>
+            </a:r>
+            <a:r>
+              <a:rPr lang="en-US" dirty="0"/>
+              <a:t> Issues</a:t>
+            </a:r>
+          </a:p>
+          <a:p>
+            <a:pPr marL="0" indent="0">
+              <a:buNone/>
+            </a:pPr>
+            <a:endParaRPr lang="en-US" dirty="0"/>
+          </a:p>
+          <a:p>
+            <a:pPr marL="0" indent="0">
+              <a:buNone/>
+            </a:pPr>
+            <a:r>
+              <a:rPr lang="en-US" dirty="0"/>
+              <a:t>By the end of the day today you should have settled on a specific case, sketched out a plan, and have started some work.</a:t>
+            </a:r>
+          </a:p>
+          <a:p>
+            <a:pPr marL="0" indent="0">
+              <a:buNone/>
+            </a:pPr>
+            <a:endParaRPr lang="en-US" dirty="0"/>
+          </a:p>
+        </p:txBody>
+      </p:sp>
+    </p:spTree>
+    <p:extLst>
+      <p:ext uri="{BB962C8B-B14F-4D97-AF65-F5344CB8AC3E}">
+        <p14:creationId xmlns:p14="http://schemas.microsoft.com/office/powerpoint/2010/main" val="4067170402"/>
+      </p:ext>
+    </p:extLst>
+  </p:cSld>
+  <p:clrMapOvr>
+    <a:masterClrMapping/>
+  </p:clrMapOvr>
+</p:sld>
+</file>
+
+<file path=ppt/slides/slide13.xml><?xml version="1.0" encoding="utf-8"?>
+<p:sld xmlns:a="http://schemas.openxmlformats.org/drawingml/2006/main" xmlns:r="http://schemas.openxmlformats.org/officeDocument/2006/relationships" xmlns:p="http://schemas.openxmlformats.org/presentationml/2006/main">
+  <p:cSld>
+    <p:spTree>
+      <p:nvGrpSpPr>
+        <p:cNvPr id="1" name=""/>
+        <p:cNvGrpSpPr/>
+        <p:nvPr/>
+      </p:nvGrpSpPr>
+      <p:grpSpPr>
+        <a:xfrm>
+          <a:off x="0" y="0"/>
+          <a:ext cx="0" cy="0"/>
+          <a:chOff x="0" y="0"/>
+          <a:chExt cx="0" cy="0"/>
+        </a:xfrm>
+      </p:grpSpPr>
+      <p:sp>
+        <p:nvSpPr>
           <p:cNvPr id="3" name="Content Placeholder 2">
             <a:extLst>
               <a:ext uri="{FF2B5EF4-FFF2-40B4-BE49-F238E27FC236}">
@@ -2644,7 +2973,7 @@
 </p:sld>
 </file>
 
-<file path=ppt/slides/slide13.xml><?xml version="1.0" encoding="utf-8"?>
+<file path=ppt/slides/slide14.xml><?xml version="1.0" encoding="utf-8"?>
 <p:sld xmlns:a="http://schemas.openxmlformats.org/drawingml/2006/main" xmlns:r="http://schemas.openxmlformats.org/officeDocument/2006/relationships" xmlns:p="http://schemas.openxmlformats.org/presentationml/2006/main">
   <p:cSld>
     <p:spTree>
@@ -2742,7 +3071,12 @@
             <p:ph idx="1"/>
           </p:nvPr>
         </p:nvSpPr>
-        <p:spPr/>
+        <p:spPr>
+          <a:xfrm>
+            <a:off x="1989438" y="948296"/>
+            <a:ext cx="9662984" cy="4440134"/>
+          </a:xfrm>
+        </p:spPr>
         <p:txBody>
           <a:bodyPr/>
           <a:lstStyle/>
@@ -2846,6 +3180,89 @@
           <a:prstGeom prst="rect">
             <a:avLst/>
           </a:prstGeom>
+        </p:spPr>
+      </p:pic>
+      <p:sp>
+        <p:nvSpPr>
+          <p:cNvPr id="2" name="Rectangle 1">
+            <a:extLst>
+              <a:ext uri="{FF2B5EF4-FFF2-40B4-BE49-F238E27FC236}">
+                <a16:creationId xmlns:a16="http://schemas.microsoft.com/office/drawing/2014/main" id="{A8315A38-3AC4-D409-08C0-5AD5662C5228}"/>
+              </a:ext>
+            </a:extLst>
+          </p:cNvPr>
+          <p:cNvSpPr/>
+          <p:nvPr/>
+        </p:nvSpPr>
+        <p:spPr>
+          <a:xfrm>
+            <a:off x="4398151" y="5894662"/>
+            <a:ext cx="1584856" cy="400110"/>
+          </a:xfrm>
+          <a:prstGeom prst="rect">
+            <a:avLst/>
+          </a:prstGeom>
+        </p:spPr>
+        <p:txBody>
+          <a:bodyPr wrap="none">
+            <a:spAutoFit/>
+          </a:bodyPr>
+          <a:lstStyle/>
+          <a:p>
+            <a:pPr algn="ctr"/>
+            <a:r>
+              <a:rPr lang="en-US" sz="2000" dirty="0"/>
+              <a:t>Supported by</a:t>
+            </a:r>
+            <a:endParaRPr lang="en-NL" sz="2000" dirty="0"/>
+          </a:p>
+        </p:txBody>
+      </p:sp>
+      <p:pic>
+        <p:nvPicPr>
+          <p:cNvPr id="1026" name="Picture 2" descr="Logos &amp; Brand Guidelines | NVIDIA">
+            <a:extLst>
+              <a:ext uri="{FF2B5EF4-FFF2-40B4-BE49-F238E27FC236}">
+                <a16:creationId xmlns:a16="http://schemas.microsoft.com/office/drawing/2014/main" id="{D45BB287-B6FE-828D-EC09-49526CD5BC27}"/>
+              </a:ext>
+            </a:extLst>
+          </p:cNvPr>
+          <p:cNvPicPr>
+            <a:picLocks noChangeAspect="1" noChangeArrowheads="1"/>
+          </p:cNvPicPr>
+          <p:nvPr/>
+        </p:nvPicPr>
+        <p:blipFill>
+          <a:blip r:embed="rId5">
+            <a:extLst>
+              <a:ext uri="{28A0092B-C50C-407E-A947-70E740481C1C}">
+                <a14:useLocalDpi xmlns:a14="http://schemas.microsoft.com/office/drawing/2010/main" val="0"/>
+              </a:ext>
+            </a:extLst>
+          </a:blip>
+          <a:srcRect/>
+          <a:stretch>
+            <a:fillRect/>
+          </a:stretch>
+        </p:blipFill>
+        <p:spPr bwMode="auto">
+          <a:xfrm>
+            <a:off x="5874005" y="5453746"/>
+            <a:ext cx="2279010" cy="1281943"/>
+          </a:xfrm>
+          <a:prstGeom prst="rect">
+            <a:avLst/>
+          </a:prstGeom>
+          <a:noFill/>
+          <a:extLst>
+            <a:ext uri="{909E8E84-426E-40DD-AFC4-6F175D3DCCD1}">
+              <a14:hiddenFill xmlns:a14="http://schemas.microsoft.com/office/drawing/2010/main">
+                <a:solidFill>
+                  <a:srgbClr val="FFFFFF"/>
+                </a:solidFill>
+              </a14:hiddenFill>
+            </a:ext>
+          </a:extLst>
         </p:spPr>
       </p:pic>
     </p:spTree>
@@ -3010,7 +3427,12 @@
             <p:ph idx="1"/>
           </p:nvPr>
         </p:nvSpPr>
-        <p:spPr/>
+        <p:spPr>
+          <a:xfrm>
+            <a:off x="1738048" y="300874"/>
+            <a:ext cx="9662984" cy="5773179"/>
+          </a:xfrm>
+        </p:spPr>
         <p:txBody>
           <a:bodyPr/>
           <a:lstStyle/>
@@ -3022,6 +3444,11 @@
               <a:rPr lang="en-US" dirty="0"/>
               <a:t>Meet your facilitators</a:t>
             </a:r>
+          </a:p>
+          <a:p>
+            <a:pPr marL="0" indent="0" algn="ctr">
+              <a:buNone/>
+            </a:pPr>
             <a:endParaRPr lang="en-NL" dirty="0"/>
           </a:p>
         </p:txBody>
@@ -3055,7 +3482,7 @@
         </p:blipFill>
         <p:spPr bwMode="auto">
           <a:xfrm>
-            <a:off x="9546848" y="2646970"/>
+            <a:off x="9557499" y="2782907"/>
             <a:ext cx="1832882" cy="1832882"/>
           </a:xfrm>
           <a:prstGeom prst="ellipse">
@@ -3125,7 +3552,7 @@
         </p:blipFill>
         <p:spPr bwMode="auto">
           <a:xfrm>
-            <a:off x="1738048" y="1324882"/>
+            <a:off x="1738048" y="1146207"/>
             <a:ext cx="1832882" cy="1832882"/>
           </a:xfrm>
           <a:prstGeom prst="ellipse">
@@ -3180,7 +3607,7 @@
         </p:nvSpPr>
         <p:spPr>
           <a:xfrm>
-            <a:off x="3593420" y="1515430"/>
+            <a:off x="3593420" y="1336755"/>
             <a:ext cx="7703230" cy="1323439"/>
           </a:xfrm>
           <a:prstGeom prst="rect">
@@ -3259,7 +3686,7 @@
         </p:nvSpPr>
         <p:spPr>
           <a:xfrm>
-            <a:off x="1843618" y="2940862"/>
+            <a:off x="1843618" y="2919839"/>
             <a:ext cx="7703230" cy="338554"/>
           </a:xfrm>
           <a:prstGeom prst="rect">
@@ -3298,7 +3725,7 @@
         </p:nvSpPr>
         <p:spPr>
           <a:xfrm>
-            <a:off x="1830538" y="3236458"/>
+            <a:off x="1830538" y="3215435"/>
             <a:ext cx="7875210" cy="1323439"/>
           </a:xfrm>
           <a:prstGeom prst="rect">
@@ -3355,6 +3782,164 @@
                 <a:latin typeface="Century Gothic" panose="020B0502020202020204" pitchFamily="34" charset="0"/>
               </a:rPr>
               <a:t> from Imperial College London, where he worked on the stochastic reconstruction of porous media and geophysical inverse problems using deep learning.  He currently also serves as a member of the EAGE AI committee and SEG special interest group for machine learning.</a:t>
+            </a:r>
+          </a:p>
+        </p:txBody>
+      </p:sp>
+      <p:pic>
+        <p:nvPicPr>
+          <p:cNvPr id="12" name="Picture 2">
+            <a:extLst>
+              <a:ext uri="{FF2B5EF4-FFF2-40B4-BE49-F238E27FC236}">
+                <a16:creationId xmlns:a16="http://schemas.microsoft.com/office/drawing/2014/main" id="{7CE3C14B-EF38-2C53-9BF0-331DDA1DEA1C}"/>
+              </a:ext>
+            </a:extLst>
+          </p:cNvPr>
+          <p:cNvPicPr>
+            <a:picLocks noChangeAspect="1" noChangeArrowheads="1"/>
+          </p:cNvPicPr>
+          <p:nvPr/>
+        </p:nvPicPr>
+        <p:blipFill>
+          <a:blip r:embed="rId4"/>
+          <a:srcRect/>
+          <a:stretch/>
+        </p:blipFill>
+        <p:spPr bwMode="auto">
+          <a:xfrm>
+            <a:off x="2050742" y="4806514"/>
+            <a:ext cx="1832882" cy="1832882"/>
+          </a:xfrm>
+          <a:prstGeom prst="ellipse">
+            <a:avLst/>
+          </a:prstGeom>
+          <a:ln w="63500" cap="rnd">
+            <a:solidFill>
+              <a:srgbClr val="333333"/>
+            </a:solidFill>
+          </a:ln>
+          <a:effectLst>
+            <a:outerShdw blurRad="381000" dist="292100" dir="5400000" sx="-80000" sy="-18000" rotWithShape="0">
+              <a:srgbClr val="000000">
+                <a:alpha val="22000"/>
+              </a:srgbClr>
+            </a:outerShdw>
+          </a:effectLst>
+          <a:scene3d>
+            <a:camera prst="orthographicFront"/>
+            <a:lightRig rig="contrasting" dir="t">
+              <a:rot lat="0" lon="0" rev="3000000"/>
+            </a:lightRig>
+          </a:scene3d>
+          <a:sp3d contourW="7620">
+            <a:bevelT w="95250" h="31750"/>
+            <a:contourClr>
+              <a:srgbClr val="333333"/>
+            </a:contourClr>
+          </a:sp3d>
+          <a:extLst>
+            <a:ext uri="{909E8E84-426E-40DD-AFC4-6F175D3DCCD1}">
+              <a14:hiddenFill xmlns:a14="http://schemas.microsoft.com/office/drawing/2010/main">
+                <a:solidFill>
+                  <a:srgbClr val="FFFFFF"/>
+                </a:solidFill>
+              </a14:hiddenFill>
+            </a:ext>
+          </a:extLst>
+        </p:spPr>
+      </p:pic>
+      <p:sp>
+        <p:nvSpPr>
+          <p:cNvPr id="13" name="TextBox 12">
+            <a:extLst>
+              <a:ext uri="{FF2B5EF4-FFF2-40B4-BE49-F238E27FC236}">
+                <a16:creationId xmlns:a16="http://schemas.microsoft.com/office/drawing/2014/main" id="{3D97A3B3-EC8F-C95C-0197-78ABC9B3C813}"/>
+              </a:ext>
+            </a:extLst>
+          </p:cNvPr>
+          <p:cNvSpPr txBox="1"/>
+          <p:nvPr/>
+        </p:nvSpPr>
+        <p:spPr>
+          <a:xfrm>
+            <a:off x="3987728" y="4925505"/>
+            <a:ext cx="7703230" cy="338554"/>
+          </a:xfrm>
+          <a:prstGeom prst="rect">
+            <a:avLst/>
+          </a:prstGeom>
+          <a:noFill/>
+        </p:spPr>
+        <p:txBody>
+          <a:bodyPr wrap="square" rtlCol="0">
+            <a:spAutoFit/>
+          </a:bodyPr>
+          <a:lstStyle/>
+          <a:p>
+            <a:r>
+              <a:rPr lang="en-US" sz="1600" b="1" i="0" dirty="0">
+                <a:effectLst/>
+                <a:latin typeface="Century Gothic" panose="020B0502020202020204" pitchFamily="34" charset="0"/>
+              </a:rPr>
+              <a:t>Oleg Ovcharenko (NVIDIA)</a:t>
+            </a:r>
+          </a:p>
+        </p:txBody>
+      </p:sp>
+      <p:sp>
+        <p:nvSpPr>
+          <p:cNvPr id="14" name="TextBox 13">
+            <a:extLst>
+              <a:ext uri="{FF2B5EF4-FFF2-40B4-BE49-F238E27FC236}">
+                <a16:creationId xmlns:a16="http://schemas.microsoft.com/office/drawing/2014/main" id="{2D1C4300-298C-57E3-AB3D-C26CE594B834}"/>
+              </a:ext>
+            </a:extLst>
+          </p:cNvPr>
+          <p:cNvSpPr txBox="1"/>
+          <p:nvPr/>
+        </p:nvSpPr>
+        <p:spPr>
+          <a:xfrm>
+            <a:off x="4009319" y="5231250"/>
+            <a:ext cx="7875210" cy="1077218"/>
+          </a:xfrm>
+          <a:prstGeom prst="rect">
+            <a:avLst/>
+          </a:prstGeom>
+          <a:noFill/>
+        </p:spPr>
+        <p:txBody>
+          <a:bodyPr wrap="square">
+            <a:spAutoFit/>
+          </a:bodyPr>
+          <a:lstStyle/>
+          <a:p>
+            <a:r>
+              <a:rPr lang="en-US" sz="1600" dirty="0">
+                <a:solidFill>
+                  <a:srgbClr val="6E3C41"/>
+                </a:solidFill>
+                <a:latin typeface="Century Gothic" panose="020B0502020202020204" pitchFamily="34" charset="0"/>
+              </a:rPr>
+              <a:t>Oleg is Solutions Architect for Energy at NVIDIA. He received his </a:t>
+            </a:r>
+            <a:r>
+              <a:rPr lang="en-US" sz="1600" dirty="0" err="1">
+                <a:solidFill>
+                  <a:srgbClr val="6E3C41"/>
+                </a:solidFill>
+                <a:latin typeface="Century Gothic" panose="020B0502020202020204" pitchFamily="34" charset="0"/>
+              </a:rPr>
+              <a:t>Ph.D</a:t>
+            </a:r>
+            <a:r>
+              <a:rPr lang="en-US" sz="1600" dirty="0">
+                <a:solidFill>
+                  <a:srgbClr val="6E3C41"/>
+                </a:solidFill>
+                <a:latin typeface="Century Gothic" panose="020B0502020202020204" pitchFamily="34" charset="0"/>
+              </a:rPr>
+              <a:t> from KAUST where he was exploring data-driven methods for the initialization of full-waveform inversion. Oleg is broadly interested in HPC and deep learning applications in geophysics.</a:t>
             </a:r>
           </a:p>
         </p:txBody>
@@ -3887,11 +4472,13 @@
         <p:spPr>
           <a:xfrm>
             <a:off x="2022776" y="1291195"/>
-            <a:ext cx="9662984" cy="5773179"/>
-          </a:xfrm>
-        </p:spPr>
-        <p:txBody>
-          <a:bodyPr/>
+            <a:ext cx="9662984" cy="5447061"/>
+          </a:xfrm>
+        </p:spPr>
+        <p:txBody>
+          <a:bodyPr>
+            <a:normAutofit/>
+          </a:bodyPr>
           <a:lstStyle/>
           <a:p>
             <a:pPr marL="0" indent="0" algn="ctr">
@@ -3943,9 +4530,46 @@
               <a:buNone/>
             </a:pPr>
             <a:r>
-              <a:rPr lang="en-US" dirty="0"/>
-              <a:t>These two teams will have their final presentations replayed in the AI special session during the annual meeting!</a:t>
-            </a:r>
+              <a:rPr lang="en-US" sz="2000" dirty="0"/>
+              <a:t>These two teams will have their </a:t>
+            </a:r>
+            <a:r>
+              <a:rPr lang="en-US" sz="2000" b="1" dirty="0"/>
+              <a:t>final presentations replayed </a:t>
+            </a:r>
+            <a:r>
+              <a:rPr lang="en-US" sz="2000" dirty="0"/>
+              <a:t>in the AI special session during the annual meeting!</a:t>
+            </a:r>
+          </a:p>
+          <a:p>
+            <a:pPr marL="0" indent="0" algn="ctr">
+              <a:buNone/>
+            </a:pPr>
+            <a:endParaRPr lang="en-US" sz="2000" dirty="0"/>
+          </a:p>
+          <a:p>
+            <a:pPr marL="0" indent="0" algn="ctr">
+              <a:buNone/>
+            </a:pPr>
+            <a:r>
+              <a:rPr lang="en-US" sz="2000" dirty="0"/>
+              <a:t>The winners will also be awarded </a:t>
+            </a:r>
+            <a:r>
+              <a:rPr lang="en-US" sz="2000" b="1" dirty="0"/>
+              <a:t>free access codes </a:t>
+            </a:r>
+            <a:r>
+              <a:rPr lang="en-US" sz="2000" dirty="0"/>
+              <a:t>for self-paced online courses from NVIDIA Deep Learning Institute</a:t>
+            </a:r>
+          </a:p>
+          <a:p>
+            <a:pPr marL="0" indent="0" algn="ctr">
+              <a:buNone/>
+            </a:pPr>
+            <a:endParaRPr lang="en-US" sz="2400" dirty="0"/>
           </a:p>
         </p:txBody>
       </p:sp>
@@ -4455,7 +5079,7 @@
         </p:spPr>
         <p:txBody>
           <a:bodyPr>
-            <a:normAutofit lnSpcReduction="10000"/>
+            <a:normAutofit/>
           </a:bodyPr>
           <a:lstStyle/>
           <a:p>
@@ -4501,14 +5125,8 @@
             </a:r>
           </a:p>
           <a:p>
-            <a:pPr marL="514350" indent="-514350">
-              <a:buAutoNum type="arabicPeriod"/>
-            </a:pPr>
-            <a:endParaRPr lang="en-US" dirty="0"/>
-          </a:p>
-          <a:p>
-            <a:pPr marL="514350" indent="-514350">
-              <a:buAutoNum type="arabicPeriod"/>
+            <a:pPr marL="0" indent="0">
+              <a:buNone/>
             </a:pPr>
             <a:endParaRPr lang="en-US" dirty="0"/>
           </a:p>

</xml_diff>